<commit_message>
Diverse wijzigingen ES6 en FP
</commit_message>
<xml_diff>
--- a/frontend-cursus/ 5 - Functional programmming.pptx
+++ b/frontend-cursus/ 5 - Functional programmming.pptx
@@ -2539,6 +2539,97 @@
               </a:spcBef>
               <a:buNone/>
             </a:pPr>
+            <a:r>
+              <a:rPr lang="en-US" sz="2200" b="0" i="0" u="none" strike="noStrike" kern="1200" cap="none" dirty="0" smtClean="0">
+                <a:solidFill>
+                  <a:schemeClr val="tx1"/>
+                </a:solidFill>
+                <a:effectLst/>
+                <a:latin typeface="Helvetica Neue"/>
+                <a:ea typeface="Helvetica Neue"/>
+                <a:cs typeface="Helvetica Neue"/>
+                <a:sym typeface="Helvetica Neue"/>
+              </a:rPr>
+              <a:t>Welk </a:t>
+            </a:r>
+            <a:r>
+              <a:rPr lang="en-US" sz="2200" b="0" i="0" u="none" strike="noStrike" kern="1200" cap="none" dirty="0" err="1" smtClean="0">
+                <a:solidFill>
+                  <a:schemeClr val="tx1"/>
+                </a:solidFill>
+                <a:effectLst/>
+                <a:latin typeface="Helvetica Neue"/>
+                <a:ea typeface="Helvetica Neue"/>
+                <a:cs typeface="Helvetica Neue"/>
+                <a:sym typeface="Helvetica Neue"/>
+              </a:rPr>
+              <a:t>getal</a:t>
+            </a:r>
+            <a:r>
+              <a:rPr lang="en-US" sz="2200" b="0" i="0" u="none" strike="noStrike" kern="1200" cap="none" dirty="0" smtClean="0">
+                <a:solidFill>
+                  <a:schemeClr val="tx1"/>
+                </a:solidFill>
+                <a:effectLst/>
+                <a:latin typeface="Helvetica Neue"/>
+                <a:ea typeface="Helvetica Neue"/>
+                <a:cs typeface="Helvetica Neue"/>
+                <a:sym typeface="Helvetica Neue"/>
+              </a:rPr>
+              <a:t> is NIET </a:t>
+            </a:r>
+            <a:r>
+              <a:rPr lang="en-US" sz="2200" b="0" i="0" u="none" strike="noStrike" kern="1200" cap="none" dirty="0" err="1" smtClean="0">
+                <a:solidFill>
+                  <a:schemeClr val="tx1"/>
+                </a:solidFill>
+                <a:effectLst/>
+                <a:latin typeface="Helvetica Neue"/>
+                <a:ea typeface="Helvetica Neue"/>
+                <a:cs typeface="Helvetica Neue"/>
+                <a:sym typeface="Helvetica Neue"/>
+              </a:rPr>
+              <a:t>deelbaar</a:t>
+            </a:r>
+            <a:r>
+              <a:rPr lang="en-US" sz="2200" b="0" i="0" u="none" strike="noStrike" kern="1200" cap="none" dirty="0" smtClean="0">
+                <a:solidFill>
+                  <a:schemeClr val="tx1"/>
+                </a:solidFill>
+                <a:effectLst/>
+                <a:latin typeface="Helvetica Neue"/>
+                <a:ea typeface="Helvetica Neue"/>
+                <a:cs typeface="Helvetica Neue"/>
+                <a:sym typeface="Helvetica Neue"/>
+              </a:rPr>
+              <a:t> door 2. (1 </a:t>
+            </a:r>
+            <a:r>
+              <a:rPr lang="en-US" sz="2200" b="0" i="0" u="none" strike="noStrike" kern="1200" cap="none" dirty="0" err="1" smtClean="0">
+                <a:solidFill>
+                  <a:schemeClr val="tx1"/>
+                </a:solidFill>
+                <a:effectLst/>
+                <a:latin typeface="Helvetica Neue"/>
+                <a:ea typeface="Helvetica Neue"/>
+                <a:cs typeface="Helvetica Neue"/>
+                <a:sym typeface="Helvetica Neue"/>
+              </a:rPr>
+              <a:t>en</a:t>
+            </a:r>
+            <a:r>
+              <a:rPr lang="en-US" sz="2200" b="0" i="0" u="none" strike="noStrike" kern="1200" cap="none" dirty="0" smtClean="0">
+                <a:solidFill>
+                  <a:schemeClr val="tx1"/>
+                </a:solidFill>
+                <a:effectLst/>
+                <a:latin typeface="Helvetica Neue"/>
+                <a:ea typeface="Helvetica Neue"/>
+                <a:cs typeface="Helvetica Neue"/>
+                <a:sym typeface="Helvetica Neue"/>
+              </a:rPr>
+              <a:t> 3)</a:t>
+            </a:r>
             <a:endParaRPr lang="en-US" sz="2200" b="0" i="0" u="none" strike="noStrike" kern="1200" cap="none" dirty="0" smtClean="0">
               <a:solidFill>
                 <a:schemeClr val="tx1"/>
@@ -3903,6 +3994,71 @@
               </a:spcBef>
               <a:buNone/>
             </a:pPr>
+            <a:r>
+              <a:rPr lang="en-US" sz="2200" b="0" i="0" u="none" strike="noStrike" kern="1200" cap="none" dirty="0" smtClean="0">
+                <a:solidFill>
+                  <a:schemeClr val="tx1"/>
+                </a:solidFill>
+                <a:effectLst/>
+                <a:latin typeface="Helvetica Neue"/>
+                <a:ea typeface="Helvetica Neue"/>
+                <a:cs typeface="Helvetica Neue"/>
+                <a:sym typeface="Helvetica Neue"/>
+              </a:rPr>
+              <a:t>https://</a:t>
+            </a:r>
+            <a:r>
+              <a:rPr lang="en-US" sz="2200" b="0" i="0" u="none" strike="noStrike" kern="1200" cap="none" dirty="0" err="1" smtClean="0">
+                <a:solidFill>
+                  <a:schemeClr val="tx1"/>
+                </a:solidFill>
+                <a:effectLst/>
+                <a:latin typeface="Helvetica Neue"/>
+                <a:ea typeface="Helvetica Neue"/>
+                <a:cs typeface="Helvetica Neue"/>
+                <a:sym typeface="Helvetica Neue"/>
+              </a:rPr>
+              <a:t>developer.mozilla.org</a:t>
+            </a:r>
+            <a:r>
+              <a:rPr lang="en-US" sz="2200" b="0" i="0" u="none" strike="noStrike" kern="1200" cap="none" dirty="0" smtClean="0">
+                <a:solidFill>
+                  <a:schemeClr val="tx1"/>
+                </a:solidFill>
+                <a:effectLst/>
+                <a:latin typeface="Helvetica Neue"/>
+                <a:ea typeface="Helvetica Neue"/>
+                <a:cs typeface="Helvetica Neue"/>
+                <a:sym typeface="Helvetica Neue"/>
+              </a:rPr>
+              <a:t>/</a:t>
+            </a:r>
+            <a:r>
+              <a:rPr lang="en-US" sz="2200" b="0" i="0" u="none" strike="noStrike" kern="1200" cap="none" dirty="0" err="1" smtClean="0">
+                <a:solidFill>
+                  <a:schemeClr val="tx1"/>
+                </a:solidFill>
+                <a:effectLst/>
+                <a:latin typeface="Helvetica Neue"/>
+                <a:ea typeface="Helvetica Neue"/>
+                <a:cs typeface="Helvetica Neue"/>
+                <a:sym typeface="Helvetica Neue"/>
+              </a:rPr>
+              <a:t>en</a:t>
+            </a:r>
+            <a:r>
+              <a:rPr lang="en-US" sz="2200" b="0" i="0" u="none" strike="noStrike" kern="1200" cap="none" dirty="0" smtClean="0">
+                <a:solidFill>
+                  <a:schemeClr val="tx1"/>
+                </a:solidFill>
+                <a:effectLst/>
+                <a:latin typeface="Helvetica Neue"/>
+                <a:ea typeface="Helvetica Neue"/>
+                <a:cs typeface="Helvetica Neue"/>
+                <a:sym typeface="Helvetica Neue"/>
+              </a:rPr>
+              <a:t>-US/docs/Web/JavaScript/Reference</a:t>
+            </a:r>
             <a:endParaRPr lang="en-US" sz="2200" b="0" i="0" u="none" strike="noStrike" kern="1200" cap="none" dirty="0" smtClean="0">
               <a:solidFill>
                 <a:schemeClr val="tx1"/>
@@ -4955,6 +5111,58 @@
                 <a:sym typeface="Helvetica Neue"/>
               </a:rPr>
               <a:t>Pure functions depend only on their arguments and return a value without causing side-effects. These functions will always return the same output given a specific input. </a:t>
+            </a:r>
+            <a:r>
+              <a:rPr lang="en-US" sz="2200" b="0" i="0" u="none" strike="noStrike" kern="1200" cap="none" dirty="0" smtClean="0">
+                <a:solidFill>
+                  <a:schemeClr val="tx1"/>
+                </a:solidFill>
+                <a:effectLst/>
+                <a:latin typeface="Helvetica Neue"/>
+                <a:ea typeface="Helvetica Neue"/>
+                <a:cs typeface="Helvetica Neue"/>
+                <a:sym typeface="Helvetica Neue"/>
+              </a:rPr>
+              <a:t>JE KAN NU</a:t>
+            </a:r>
+            <a:r>
+              <a:rPr lang="en-US" sz="2200" b="0" i="0" u="none" strike="noStrike" kern="1200" cap="none" baseline="0" dirty="0" smtClean="0">
+                <a:solidFill>
+                  <a:schemeClr val="tx1"/>
+                </a:solidFill>
+                <a:effectLst/>
+                <a:latin typeface="Helvetica Neue"/>
+                <a:ea typeface="Helvetica Neue"/>
+                <a:cs typeface="Helvetica Neue"/>
+                <a:sym typeface="Helvetica Neue"/>
+              </a:rPr>
+              <a:t> DE FUNCTIE AANROEPEN VOOR DE JUISTE WAARDE </a:t>
+            </a:r>
+            <a:r>
+              <a:rPr lang="en-US" sz="2200" b="0" i="0" u="none" strike="noStrike" kern="1200" cap="none" baseline="0" dirty="0" err="1" smtClean="0">
+                <a:solidFill>
+                  <a:schemeClr val="tx1"/>
+                </a:solidFill>
+                <a:effectLst/>
+                <a:latin typeface="Helvetica Neue"/>
+                <a:ea typeface="Helvetica Neue"/>
+                <a:cs typeface="Helvetica Neue"/>
+                <a:sym typeface="Helvetica Neue"/>
+              </a:rPr>
+              <a:t>ipv</a:t>
+            </a:r>
+            <a:r>
+              <a:rPr lang="en-US" sz="2200" b="0" i="0" u="none" strike="noStrike" kern="1200" cap="none" baseline="0" dirty="0" smtClean="0">
+                <a:solidFill>
+                  <a:schemeClr val="tx1"/>
+                </a:solidFill>
+                <a:effectLst/>
+                <a:latin typeface="Helvetica Neue"/>
+                <a:ea typeface="Helvetica Neue"/>
+                <a:cs typeface="Helvetica Neue"/>
+                <a:sym typeface="Helvetica Neue"/>
+              </a:rPr>
+              <a:t> DE GLOBALE ‘COUNT’ VAR.</a:t>
             </a:r>
             <a:endParaRPr dirty="0"/>
           </a:p>
@@ -12751,11 +12959,6 @@
               </a:rPr>
               <a:t>(immutable)</a:t>
             </a:r>
-            <a:endParaRPr lang="en-US" sz="2800" dirty="0" smtClean="0">
-              <a:solidFill>
-                <a:schemeClr val="bg1"/>
-              </a:solidFill>
-            </a:endParaRPr>
           </a:p>
           <a:p>
             <a:pPr marL="571500" lvl="2" indent="-571500">
@@ -17966,7 +18169,19 @@
             </a:r>
             <a:r>
               <a:rPr lang="en-US" sz="3200" dirty="0"/>
-              <a:t> factorial = function ( n ) { </a:t>
+              <a:t> </a:t>
+            </a:r>
+            <a:r>
+              <a:rPr lang="en-US" sz="3200" b="1" dirty="0">
+                <a:solidFill>
+                  <a:srgbClr val="92D050"/>
+                </a:solidFill>
+              </a:rPr>
+              <a:t>factorial</a:t>
+            </a:r>
+            <a:r>
+              <a:rPr lang="en-US" sz="3200" dirty="0"/>
+              <a:t> = function ( n ) { </a:t>
             </a:r>
             <a:endParaRPr lang="en-US" sz="3200" dirty="0" smtClean="0"/>
           </a:p>
@@ -18053,7 +18268,19 @@
             </a:r>
             <a:r>
               <a:rPr lang="en-US" sz="3200" dirty="0"/>
-              <a:t>n * factorial( n - 1 ); </a:t>
+              <a:t>n * </a:t>
+            </a:r>
+            <a:r>
+              <a:rPr lang="en-US" sz="3200" b="1" dirty="0">
+                <a:solidFill>
+                  <a:srgbClr val="92D050"/>
+                </a:solidFill>
+              </a:rPr>
+              <a:t>factorial</a:t>
+            </a:r>
+            <a:r>
+              <a:rPr lang="en-US" sz="3200" dirty="0"/>
+              <a:t>( n - 1 ); </a:t>
             </a:r>
             <a:endParaRPr lang="en-US" sz="3200" dirty="0" smtClean="0"/>
           </a:p>
@@ -18091,7 +18318,15 @@
             </a:r>
             <a:r>
               <a:rPr lang="en-US" sz="3200" dirty="0" smtClean="0"/>
-              <a:t>(factorial</a:t>
+              <a:t>(</a:t>
+            </a:r>
+            <a:r>
+              <a:rPr lang="en-US" sz="3200" b="1" dirty="0" smtClean="0">
+                <a:solidFill>
+                  <a:srgbClr val="92D050"/>
+                </a:solidFill>
+              </a:rPr>
+              <a:t>factorial</a:t>
             </a:r>
             <a:r>
               <a:rPr lang="en-US" sz="3200" dirty="0"/>
@@ -18538,9 +18773,82 @@
                   <a:srgbClr val="FFC000"/>
                 </a:solidFill>
               </a:rPr>
-              <a:t>Use editor in MDN !</a:t>
-            </a:r>
-            <a:endParaRPr lang="en-US" sz="3200" dirty="0"/>
+              <a:t>Use editor in </a:t>
+            </a:r>
+            <a:r>
+              <a:rPr lang="en-US" sz="3200" dirty="0" smtClean="0">
+                <a:solidFill>
+                  <a:srgbClr val="FFC000"/>
+                </a:solidFill>
+              </a:rPr>
+              <a:t>MDN:</a:t>
+            </a:r>
+          </a:p>
+          <a:p>
+            <a:pPr marL="180975" indent="0">
+              <a:spcBef>
+                <a:spcPts val="0"/>
+              </a:spcBef>
+              <a:buNone/>
+            </a:pPr>
+            <a:endParaRPr lang="en-US" sz="3200" dirty="0" smtClean="0">
+              <a:solidFill>
+                <a:srgbClr val="FFC000"/>
+              </a:solidFill>
+            </a:endParaRPr>
+          </a:p>
+          <a:p>
+            <a:pPr marL="180975" indent="0">
+              <a:spcBef>
+                <a:spcPts val="0"/>
+              </a:spcBef>
+              <a:buNone/>
+            </a:pPr>
+            <a:r>
+              <a:rPr lang="en-US" sz="3200" b="1" dirty="0">
+                <a:solidFill>
+                  <a:srgbClr val="FFFF00"/>
+                </a:solidFill>
+              </a:rPr>
+              <a:t>https://</a:t>
+            </a:r>
+            <a:r>
+              <a:rPr lang="en-US" sz="3200" b="1" dirty="0" err="1">
+                <a:solidFill>
+                  <a:srgbClr val="FFFF00"/>
+                </a:solidFill>
+              </a:rPr>
+              <a:t>developer.mozilla.org</a:t>
+            </a:r>
+            <a:r>
+              <a:rPr lang="en-US" sz="3200" b="1" dirty="0">
+                <a:solidFill>
+                  <a:srgbClr val="FFFF00"/>
+                </a:solidFill>
+              </a:rPr>
+              <a:t>/</a:t>
+            </a:r>
+            <a:r>
+              <a:rPr lang="en-US" sz="3200" b="1" dirty="0" err="1">
+                <a:solidFill>
+                  <a:srgbClr val="FFFF00"/>
+                </a:solidFill>
+              </a:rPr>
+              <a:t>en</a:t>
+            </a:r>
+            <a:r>
+              <a:rPr lang="en-US" sz="3200" b="1" dirty="0">
+                <a:solidFill>
+                  <a:srgbClr val="FFFF00"/>
+                </a:solidFill>
+              </a:rPr>
+              <a:t>-US/docs/Web/JavaScript/Reference </a:t>
+            </a:r>
+            <a:endParaRPr lang="en-US" sz="3200" b="1" dirty="0">
+              <a:solidFill>
+                <a:srgbClr val="FFFF00"/>
+              </a:solidFill>
+            </a:endParaRPr>
           </a:p>
           <a:p>
             <a:pPr marL="180975" indent="0">
@@ -18944,7 +19252,6 @@
               <a:rPr lang="en-US" sz="3200" dirty="0" smtClean="0"/>
               <a:t>(map1); </a:t>
             </a:r>
-            <a:endParaRPr lang="en-US" sz="3200" dirty="0" smtClean="0"/>
           </a:p>
           <a:p>
             <a:pPr marL="180975" indent="0">
@@ -19283,15 +19590,7 @@
                   <a:srgbClr val="FFC000"/>
                 </a:solidFill>
               </a:rPr>
-              <a:t>Filter all words which are longer than </a:t>
-            </a:r>
-            <a:r>
-              <a:rPr lang="en-US" sz="3200" dirty="0" smtClean="0">
-                <a:solidFill>
-                  <a:srgbClr val="FFC000"/>
-                </a:solidFill>
-              </a:rPr>
-              <a:t>6</a:t>
+              <a:t>Filter all words which are longer than 6</a:t>
             </a:r>
           </a:p>
           <a:p>
@@ -21379,7 +21678,23 @@
                   <a:schemeClr val="bg1"/>
                 </a:solidFill>
               </a:rPr>
-              <a:t> array </a:t>
+              <a:t> </a:t>
+            </a:r>
+            <a:r>
+              <a:rPr lang="en-US" sz="4000" dirty="0">
+                <a:solidFill>
+                  <a:srgbClr val="92D050"/>
+                </a:solidFill>
+              </a:rPr>
+              <a:t>array</a:t>
+            </a:r>
+            <a:r>
+              <a:rPr lang="en-US" sz="4000" dirty="0">
+                <a:solidFill>
+                  <a:schemeClr val="bg1"/>
+                </a:solidFill>
+              </a:rPr>
+              <a:t> </a:t>
             </a:r>
             <a:r>
               <a:rPr lang="en-US" sz="4000" b="1" dirty="0">
@@ -21467,7 +21782,23 @@
                   <a:schemeClr val="bg1"/>
                 </a:solidFill>
               </a:rPr>
-              <a:t> (array) </a:t>
+              <a:t> (</a:t>
+            </a:r>
+            <a:r>
+              <a:rPr lang="en-US" sz="4000" dirty="0">
+                <a:solidFill>
+                  <a:srgbClr val="92D050"/>
+                </a:solidFill>
+              </a:rPr>
+              <a:t>array</a:t>
+            </a:r>
+            <a:r>
+              <a:rPr lang="en-US" sz="4000" dirty="0">
+                <a:solidFill>
+                  <a:schemeClr val="bg1"/>
+                </a:solidFill>
+              </a:rPr>
+              <a:t>) </a:t>
             </a:r>
             <a:r>
               <a:rPr lang="en-US" sz="4000" b="1" dirty="0">
@@ -21523,10 +21854,18 @@
             <a:r>
               <a:rPr lang="en-US" sz="4000" dirty="0">
                 <a:solidFill>
+                  <a:srgbClr val="92D050"/>
+                </a:solidFill>
+              </a:rPr>
+              <a:t>array</a:t>
+            </a:r>
+            <a:r>
+              <a:rPr lang="en-US" sz="4000" dirty="0">
+                <a:solidFill>
                   <a:schemeClr val="bg1"/>
                 </a:solidFill>
               </a:rPr>
-              <a:t>array[0]; </a:t>
+              <a:t>[0]; </a:t>
             </a:r>
             <a:endParaRPr lang="en-US" sz="4000" dirty="0" smtClean="0">
               <a:solidFill>
@@ -21561,7 +21900,15 @@
                   <a:schemeClr val="bg1"/>
                 </a:solidFill>
               </a:rPr>
-              <a:t>(array</a:t>
+              <a:t>(</a:t>
+            </a:r>
+            <a:r>
+              <a:rPr lang="en-US" sz="4000" dirty="0" smtClean="0">
+                <a:solidFill>
+                  <a:srgbClr val="92D050"/>
+                </a:solidFill>
+              </a:rPr>
+              <a:t>array</a:t>
             </a:r>
             <a:r>
               <a:rPr lang="en-US" sz="4000" dirty="0">
@@ -21614,10 +21961,18 @@
             <a:r>
               <a:rPr lang="en-US" sz="4000" dirty="0" err="1" smtClean="0">
                 <a:solidFill>
+                  <a:srgbClr val="92D050"/>
+                </a:solidFill>
+              </a:rPr>
+              <a:t>array</a:t>
+            </a:r>
+            <a:r>
+              <a:rPr lang="en-US" sz="4000" dirty="0" err="1" smtClean="0">
+                <a:solidFill>
                   <a:schemeClr val="bg1"/>
                 </a:solidFill>
               </a:rPr>
-              <a:t>array.sort</a:t>
+              <a:t>.sort</a:t>
             </a:r>
             <a:r>
               <a:rPr lang="en-US" sz="4000" dirty="0">
@@ -21673,7 +22028,23 @@
                   <a:schemeClr val="bg1"/>
                 </a:solidFill>
               </a:rPr>
-              <a:t>(array) </a:t>
+              <a:t>(</a:t>
+            </a:r>
+            <a:r>
+              <a:rPr lang="en-US" sz="4000" dirty="0" smtClean="0">
+                <a:solidFill>
+                  <a:srgbClr val="92D050"/>
+                </a:solidFill>
+              </a:rPr>
+              <a:t>array</a:t>
+            </a:r>
+            <a:r>
+              <a:rPr lang="en-US" sz="4000" dirty="0" smtClean="0">
+                <a:solidFill>
+                  <a:schemeClr val="bg1"/>
+                </a:solidFill>
+              </a:rPr>
+              <a:t>) </a:t>
             </a:r>
             <a:r>
               <a:rPr lang="en-US" sz="4000" i="1" dirty="0" smtClean="0">
@@ -21943,7 +22314,23 @@
                   <a:schemeClr val="bg1"/>
                 </a:solidFill>
               </a:rPr>
-              <a:t> array = </a:t>
+              <a:t> </a:t>
+            </a:r>
+            <a:r>
+              <a:rPr lang="en-US" sz="4000" dirty="0" smtClean="0">
+                <a:solidFill>
+                  <a:srgbClr val="92D050"/>
+                </a:solidFill>
+              </a:rPr>
+              <a:t>array </a:t>
+            </a:r>
+            <a:r>
+              <a:rPr lang="en-US" sz="4000" dirty="0" smtClean="0">
+                <a:solidFill>
+                  <a:schemeClr val="bg1"/>
+                </a:solidFill>
+              </a:rPr>
+              <a:t>= </a:t>
             </a:r>
             <a:r>
               <a:rPr lang="en-US" sz="4000" dirty="0">
@@ -21988,7 +22375,7 @@
             <a:r>
               <a:rPr lang="en-US" sz="2800" dirty="0" smtClean="0">
                 <a:solidFill>
-                  <a:srgbClr val="FFC000"/>
+                  <a:srgbClr val="FF0000"/>
                 </a:solidFill>
               </a:rPr>
               <a:t>// copy with </a:t>
@@ -21996,14 +22383,14 @@
             <a:r>
               <a:rPr lang="en-US" sz="2800" dirty="0">
                 <a:solidFill>
-                  <a:srgbClr val="FFC000"/>
+                  <a:srgbClr val="FF0000"/>
                 </a:solidFill>
               </a:rPr>
               <a:t>spread operator</a:t>
             </a:r>
             <a:endParaRPr lang="en-US" sz="2800" dirty="0" smtClean="0">
               <a:solidFill>
-                <a:srgbClr val="FFC000"/>
+                <a:srgbClr val="FF0000"/>
               </a:solidFill>
             </a:endParaRPr>
           </a:p>
@@ -22058,12 +22445,28 @@
               <a:t> </a:t>
             </a:r>
             <a:r>
+              <a:rPr lang="en-US" sz="4000" dirty="0">
+                <a:solidFill>
+                  <a:schemeClr val="bg1"/>
+                </a:solidFill>
+              </a:rPr>
+              <a:t>(</a:t>
+            </a:r>
+            <a:r>
               <a:rPr lang="en-US" sz="4000" dirty="0" smtClean="0">
                 <a:solidFill>
+                  <a:srgbClr val="92D050"/>
+                </a:solidFill>
+              </a:rPr>
+              <a:t>array</a:t>
+            </a:r>
+            <a:r>
+              <a:rPr lang="en-US" sz="4000" dirty="0" smtClean="0">
+                <a:solidFill>
                   <a:schemeClr val="bg1"/>
                 </a:solidFill>
               </a:rPr>
-              <a:t>(input) </a:t>
+              <a:t>) </a:t>
             </a:r>
             <a:r>
               <a:rPr lang="en-US" sz="4000" b="1" dirty="0">
@@ -22119,10 +22522,18 @@
             <a:r>
               <a:rPr lang="en-US" sz="4000" dirty="0">
                 <a:solidFill>
+                  <a:srgbClr val="92D050"/>
+                </a:solidFill>
+              </a:rPr>
+              <a:t>array</a:t>
+            </a:r>
+            <a:r>
+              <a:rPr lang="en-US" sz="4000" dirty="0">
+                <a:solidFill>
                   <a:schemeClr val="bg1"/>
                 </a:solidFill>
               </a:rPr>
-              <a:t>array[0]; </a:t>
+              <a:t>[0]; </a:t>
             </a:r>
             <a:endParaRPr lang="en-US" sz="4000" dirty="0" smtClean="0">
               <a:solidFill>
@@ -22157,7 +22568,15 @@
                   <a:schemeClr val="bg1"/>
                 </a:solidFill>
               </a:rPr>
-              <a:t>(array</a:t>
+              <a:t>(</a:t>
+            </a:r>
+            <a:r>
+              <a:rPr lang="en-US" sz="4000" dirty="0" smtClean="0">
+                <a:solidFill>
+                  <a:srgbClr val="92D050"/>
+                </a:solidFill>
+              </a:rPr>
+              <a:t>array</a:t>
             </a:r>
             <a:r>
               <a:rPr lang="en-US" sz="4000" dirty="0">
@@ -22210,10 +22629,18 @@
             <a:r>
               <a:rPr lang="en-US" sz="4000" dirty="0" err="1" smtClean="0">
                 <a:solidFill>
+                  <a:srgbClr val="92D050"/>
+                </a:solidFill>
+              </a:rPr>
+              <a:t>array</a:t>
+            </a:r>
+            <a:r>
+              <a:rPr lang="en-US" sz="4000" dirty="0" err="1" smtClean="0">
+                <a:solidFill>
                   <a:schemeClr val="bg1"/>
                 </a:solidFill>
               </a:rPr>
-              <a:t>array.sort</a:t>
+              <a:t>.sort</a:t>
             </a:r>
             <a:r>
               <a:rPr lang="en-US" sz="4000" dirty="0">
@@ -22248,7 +22675,23 @@
                   <a:schemeClr val="bg1"/>
                 </a:solidFill>
               </a:rPr>
-              <a:t>(array);  </a:t>
+              <a:t>(</a:t>
+            </a:r>
+            <a:r>
+              <a:rPr lang="en-US" sz="4000" dirty="0" smtClean="0">
+                <a:solidFill>
+                  <a:srgbClr val="92D050"/>
+                </a:solidFill>
+              </a:rPr>
+              <a:t>array</a:t>
+            </a:r>
+            <a:r>
+              <a:rPr lang="en-US" sz="4000" dirty="0" smtClean="0">
+                <a:solidFill>
+                  <a:schemeClr val="bg1"/>
+                </a:solidFill>
+              </a:rPr>
+              <a:t>);  </a:t>
             </a:r>
             <a:r>
               <a:rPr lang="en-US" sz="4000" i="1" dirty="0" smtClean="0">

</xml_diff>